<commit_message>
docs: investment committee deck complete — 12 slides
Built 12-slide investment committee presentation deck.
Dark theme consistent with Tableau dashboard design language.
Covers title, investment thesis, macro environment,
digital ecosystem, market sizing, credit risk model,
financial model, investor returns, stress testing,
Monte Carlo, risk factors and investment decision.

Key visual elements:
  Manual funnel chart — TAM 20M SAM 19.2M SOM 576K
  Unit economics waterfall — KES 630 net contribution
  4-scenario stress test panels — all clear 10% floor
  6-criteria scorecard — 5 pass 1 review
  Recommendation box — INVEST

Inserted charts from outputs/charts/ folder.
Conservative 5x exit scenario presented alongside
8x base case throughout.
</commit_message>
<xml_diff>
--- a/ppt/kenya_digital_lending_deck.pptx
+++ b/ppt/kenya_digital_lending_deck.pptx
@@ -27266,7 +27266,13 @@
         <p:nvGraphicFramePr>
           <p:cNvPr id="250" name="Google Shape;250;p18"/>
           <p:cNvGraphicFramePr/>
-          <p:nvPr/>
+          <p:nvPr>
+            <p:extLst>
+              <p:ext uri="{D42A27DB-BD31-4B8C-83A1-F6EECF244321}">
+                <p14:modId xmlns:p14="http://schemas.microsoft.com/office/powerpoint/2010/main" val="2211910255"/>
+              </p:ext>
+            </p:extLst>
+          </p:nvPr>
         </p:nvGraphicFramePr>
         <p:xfrm>
           <a:off x="428625" y="2085975"/>
@@ -27322,7 +27328,7 @@
                     <a:bodyPr/>
                     <a:lstStyle/>
                     <a:p>
-                      <a:pPr marL="0" marR="0" lvl="0" indent="0" algn="l" rtl="0">
+                      <a:pPr marL="0" marR="0" lvl="0" indent="0" algn="ctr" rtl="0">
                         <a:spcBef>
                           <a:spcPts val="0"/>
                         </a:spcBef>
@@ -27332,7 +27338,7 @@
                         <a:buNone/>
                       </a:pPr>
                       <a:r>
-                        <a:rPr lang="en-US" sz="1125" b="1" i="0" u="none" strike="noStrike" cap="none">
+                        <a:rPr lang="en-US" sz="1125" b="1" i="0" u="none" strike="noStrike" cap="none" dirty="0">
                           <a:solidFill>
                             <a:srgbClr val="E8F0FF"/>
                           </a:solidFill>
@@ -27343,7 +27349,7 @@
                         </a:rPr>
                         <a:t>Segment</a:t>
                       </a:r>
-                      <a:endParaRPr/>
+                      <a:endParaRPr dirty="0"/>
                     </a:p>
                   </a:txBody>
                   <a:tcPr marL="63500" marR="63500" marT="25400" marB="25400" anchor="ctr">
@@ -27401,7 +27407,7 @@
                     <a:bodyPr/>
                     <a:lstStyle/>
                     <a:p>
-                      <a:pPr marL="0" marR="0" lvl="0" indent="0" algn="l" rtl="0">
+                      <a:pPr marL="0" marR="0" lvl="0" indent="0" algn="ctr" rtl="0">
                         <a:spcBef>
                           <a:spcPts val="0"/>
                         </a:spcBef>
@@ -27411,7 +27417,7 @@
                         <a:buNone/>
                       </a:pPr>
                       <a:r>
-                        <a:rPr lang="en-US" sz="1125" b="1" i="0" u="none" strike="noStrike" cap="none">
+                        <a:rPr lang="en-US" sz="1125" b="1" i="0" u="none" strike="noStrike" cap="none" dirty="0">
                           <a:solidFill>
                             <a:srgbClr val="E8F0FF"/>
                           </a:solidFill>
@@ -27422,7 +27428,7 @@
                         </a:rPr>
                         <a:t>Portfolio Share</a:t>
                       </a:r>
-                      <a:endParaRPr/>
+                      <a:endParaRPr dirty="0"/>
                     </a:p>
                   </a:txBody>
                   <a:tcPr marL="63500" marR="63500" marT="25400" marB="25400" anchor="ctr">
@@ -27480,7 +27486,7 @@
                     <a:bodyPr/>
                     <a:lstStyle/>
                     <a:p>
-                      <a:pPr marL="0" marR="0" lvl="0" indent="0" algn="l" rtl="0">
+                      <a:pPr marL="0" marR="0" lvl="0" indent="0" algn="ctr" rtl="0">
                         <a:spcBef>
                           <a:spcPts val="0"/>
                         </a:spcBef>
@@ -27490,7 +27496,7 @@
                         <a:buNone/>
                       </a:pPr>
                       <a:r>
-                        <a:rPr lang="en-US" sz="1125" b="1" i="0" u="none" strike="noStrike" cap="none">
+                        <a:rPr lang="en-US" sz="1125" b="1" i="0" u="none" strike="noStrike" cap="none" dirty="0">
                           <a:solidFill>
                             <a:srgbClr val="E8F0FF"/>
                           </a:solidFill>
@@ -27501,7 +27507,7 @@
                         </a:rPr>
                         <a:t>PD</a:t>
                       </a:r>
-                      <a:endParaRPr/>
+                      <a:endParaRPr dirty="0"/>
                     </a:p>
                   </a:txBody>
                   <a:tcPr marL="63500" marR="63500" marT="25400" marB="25400" anchor="ctr">
@@ -27559,7 +27565,7 @@
                     <a:bodyPr/>
                     <a:lstStyle/>
                     <a:p>
-                      <a:pPr marL="0" marR="0" lvl="0" indent="0" algn="l" rtl="0">
+                      <a:pPr marL="0" marR="0" lvl="0" indent="0" algn="ctr" rtl="0">
                         <a:spcBef>
                           <a:spcPts val="0"/>
                         </a:spcBef>
@@ -27569,7 +27575,7 @@
                         <a:buNone/>
                       </a:pPr>
                       <a:r>
-                        <a:rPr lang="en-US" sz="1125" b="1" i="0" u="none" strike="noStrike" cap="none">
+                        <a:rPr lang="en-US" sz="1125" b="1" i="0" u="none" strike="noStrike" cap="none" dirty="0">
                           <a:solidFill>
                             <a:srgbClr val="E8F0FF"/>
                           </a:solidFill>
@@ -27580,7 +27586,7 @@
                         </a:rPr>
                         <a:t>LGD</a:t>
                       </a:r>
-                      <a:endParaRPr/>
+                      <a:endParaRPr dirty="0"/>
                     </a:p>
                   </a:txBody>
                   <a:tcPr marL="63500" marR="63500" marT="25400" marB="25400" anchor="ctr">
@@ -27638,7 +27644,7 @@
                     <a:bodyPr/>
                     <a:lstStyle/>
                     <a:p>
-                      <a:pPr marL="0" marR="0" lvl="0" indent="0" algn="l" rtl="0">
+                      <a:pPr marL="0" marR="0" lvl="0" indent="0" algn="ctr" rtl="0">
                         <a:spcBef>
                           <a:spcPts val="0"/>
                         </a:spcBef>
@@ -27648,7 +27654,7 @@
                         <a:buNone/>
                       </a:pPr>
                       <a:r>
-                        <a:rPr lang="en-US" sz="1125" b="1" i="0" u="none" strike="noStrike" cap="none">
+                        <a:rPr lang="en-US" sz="1125" b="1" i="0" u="none" strike="noStrike" cap="none" dirty="0">
                           <a:solidFill>
                             <a:srgbClr val="E8F0FF"/>
                           </a:solidFill>
@@ -27659,7 +27665,7 @@
                         </a:rPr>
                         <a:t>Recommended APR</a:t>
                       </a:r>
-                      <a:endParaRPr/>
+                      <a:endParaRPr dirty="0"/>
                     </a:p>
                   </a:txBody>
                   <a:tcPr marL="63500" marR="63500" marT="25400" marB="25400" anchor="ctr">
@@ -27724,7 +27730,7 @@
                     <a:bodyPr/>
                     <a:lstStyle/>
                     <a:p>
-                      <a:pPr marL="0" marR="0" lvl="0" indent="0" algn="l" rtl="0">
+                      <a:pPr marL="0" marR="0" lvl="0" indent="0" algn="ctr" rtl="0">
                         <a:spcBef>
                           <a:spcPts val="0"/>
                         </a:spcBef>
@@ -27734,7 +27740,7 @@
                         <a:buNone/>
                       </a:pPr>
                       <a:r>
-                        <a:rPr lang="en-US" sz="1125" b="0" i="0" u="none" strike="noStrike" cap="none">
+                        <a:rPr lang="en-US" sz="1125" b="0" i="0" u="none" strike="noStrike" cap="none" dirty="0">
                           <a:solidFill>
                             <a:srgbClr val="C8D4F0"/>
                           </a:solidFill>
@@ -27744,6 +27750,164 @@
                           <a:sym typeface="Calibri"/>
                         </a:rPr>
                         <a:t>Prime</a:t>
+                      </a:r>
+                      <a:endParaRPr dirty="0"/>
+                    </a:p>
+                  </a:txBody>
+                  <a:tcPr marL="63500" marR="63500" marT="25400" marB="25400" anchor="ctr">
+                    <a:lnL w="9525" cap="flat" cmpd="sng">
+                      <a:solidFill>
+                        <a:srgbClr val="000000">
+                          <a:alpha val="0"/>
+                        </a:srgbClr>
+                      </a:solidFill>
+                      <a:prstDash val="solid"/>
+                      <a:round/>
+                      <a:headEnd type="none" w="sm" len="sm"/>
+                      <a:tailEnd type="none" w="sm" len="sm"/>
+                    </a:lnL>
+                    <a:lnR w="9525" cap="flat" cmpd="sng">
+                      <a:solidFill>
+                        <a:srgbClr val="000000">
+                          <a:alpha val="0"/>
+                        </a:srgbClr>
+                      </a:solidFill>
+                      <a:prstDash val="solid"/>
+                      <a:round/>
+                      <a:headEnd type="none" w="sm" len="sm"/>
+                      <a:tailEnd type="none" w="sm" len="sm"/>
+                    </a:lnR>
+                    <a:lnT w="9525" cap="flat" cmpd="sng">
+                      <a:solidFill>
+                        <a:srgbClr val="000000">
+                          <a:alpha val="0"/>
+                        </a:srgbClr>
+                      </a:solidFill>
+                      <a:prstDash val="solid"/>
+                      <a:round/>
+                      <a:headEnd type="none" w="sm" len="sm"/>
+                      <a:tailEnd type="none" w="sm" len="sm"/>
+                    </a:lnT>
+                    <a:lnB w="9525" cap="flat" cmpd="sng">
+                      <a:solidFill>
+                        <a:srgbClr val="000000">
+                          <a:alpha val="0"/>
+                        </a:srgbClr>
+                      </a:solidFill>
+                      <a:prstDash val="solid"/>
+                      <a:round/>
+                      <a:headEnd type="none" w="sm" len="sm"/>
+                      <a:tailEnd type="none" w="sm" len="sm"/>
+                    </a:lnB>
+                    <a:solidFill>
+                      <a:srgbClr val="0F1420"/>
+                    </a:solidFill>
+                  </a:tcPr>
+                </a:tc>
+                <a:tc>
+                  <a:txBody>
+                    <a:bodyPr/>
+                    <a:lstStyle/>
+                    <a:p>
+                      <a:pPr marL="0" marR="0" lvl="0" indent="0" algn="ctr" rtl="0">
+                        <a:spcBef>
+                          <a:spcPts val="0"/>
+                        </a:spcBef>
+                        <a:spcAft>
+                          <a:spcPts val="0"/>
+                        </a:spcAft>
+                        <a:buNone/>
+                      </a:pPr>
+                      <a:r>
+                        <a:rPr lang="en-US" sz="1125" b="0" i="0" u="none" strike="noStrike" cap="none" dirty="0">
+                          <a:solidFill>
+                            <a:srgbClr val="C8D4F0"/>
+                          </a:solidFill>
+                          <a:latin typeface="Calibri"/>
+                          <a:ea typeface="Calibri"/>
+                          <a:cs typeface="Calibri"/>
+                          <a:sym typeface="Calibri"/>
+                        </a:rPr>
+                        <a:t>35%</a:t>
+                      </a:r>
+                      <a:endParaRPr dirty="0"/>
+                    </a:p>
+                  </a:txBody>
+                  <a:tcPr marL="63500" marR="63500" marT="25400" marB="25400" anchor="ctr">
+                    <a:lnL w="9525" cap="flat" cmpd="sng">
+                      <a:solidFill>
+                        <a:srgbClr val="000000">
+                          <a:alpha val="0"/>
+                        </a:srgbClr>
+                      </a:solidFill>
+                      <a:prstDash val="solid"/>
+                      <a:round/>
+                      <a:headEnd type="none" w="sm" len="sm"/>
+                      <a:tailEnd type="none" w="sm" len="sm"/>
+                    </a:lnL>
+                    <a:lnR w="9525" cap="flat" cmpd="sng">
+                      <a:solidFill>
+                        <a:srgbClr val="000000">
+                          <a:alpha val="0"/>
+                        </a:srgbClr>
+                      </a:solidFill>
+                      <a:prstDash val="solid"/>
+                      <a:round/>
+                      <a:headEnd type="none" w="sm" len="sm"/>
+                      <a:tailEnd type="none" w="sm" len="sm"/>
+                    </a:lnR>
+                    <a:lnT w="9525" cap="flat" cmpd="sng">
+                      <a:solidFill>
+                        <a:srgbClr val="000000">
+                          <a:alpha val="0"/>
+                        </a:srgbClr>
+                      </a:solidFill>
+                      <a:prstDash val="solid"/>
+                      <a:round/>
+                      <a:headEnd type="none" w="sm" len="sm"/>
+                      <a:tailEnd type="none" w="sm" len="sm"/>
+                    </a:lnT>
+                    <a:lnB w="9525" cap="flat" cmpd="sng">
+                      <a:solidFill>
+                        <a:srgbClr val="000000">
+                          <a:alpha val="0"/>
+                        </a:srgbClr>
+                      </a:solidFill>
+                      <a:prstDash val="solid"/>
+                      <a:round/>
+                      <a:headEnd type="none" w="sm" len="sm"/>
+                      <a:tailEnd type="none" w="sm" len="sm"/>
+                    </a:lnB>
+                    <a:solidFill>
+                      <a:srgbClr val="0F1420"/>
+                    </a:solidFill>
+                  </a:tcPr>
+                </a:tc>
+                <a:tc>
+                  <a:txBody>
+                    <a:bodyPr/>
+                    <a:lstStyle/>
+                    <a:p>
+                      <a:pPr marL="0" marR="0" lvl="0" indent="0" algn="ctr" rtl="0">
+                        <a:spcBef>
+                          <a:spcPts val="0"/>
+                        </a:spcBef>
+                        <a:spcAft>
+                          <a:spcPts val="0"/>
+                        </a:spcAft>
+                        <a:buNone/>
+                      </a:pPr>
+                      <a:r>
+                        <a:rPr lang="en-US" sz="1275" b="1" i="0" u="none" strike="noStrike" cap="none">
+                          <a:solidFill>
+                            <a:srgbClr val="00D4A0"/>
+                          </a:solidFill>
+                          <a:latin typeface="Calibri"/>
+                          <a:ea typeface="Calibri"/>
+                          <a:cs typeface="Calibri"/>
+                          <a:sym typeface="Calibri"/>
+                        </a:rPr>
+                        <a:t>3.20%</a:t>
                       </a:r>
                       <a:endParaRPr/>
                     </a:p>
@@ -27803,7 +27967,7 @@
                     <a:bodyPr/>
                     <a:lstStyle/>
                     <a:p>
-                      <a:pPr marL="0" marR="0" lvl="0" indent="0" algn="l" rtl="0">
+                      <a:pPr marL="0" marR="0" lvl="0" indent="0" algn="ctr" rtl="0">
                         <a:spcBef>
                           <a:spcPts val="0"/>
                         </a:spcBef>
@@ -27882,165 +28046,7 @@
                     <a:bodyPr/>
                     <a:lstStyle/>
                     <a:p>
-                      <a:pPr marL="0" marR="0" lvl="0" indent="0" algn="l" rtl="0">
-                        <a:spcBef>
-                          <a:spcPts val="0"/>
-                        </a:spcBef>
-                        <a:spcAft>
-                          <a:spcPts val="0"/>
-                        </a:spcAft>
-                        <a:buNone/>
-                      </a:pPr>
-                      <a:r>
-                        <a:rPr lang="en-US" sz="1275" b="1" i="0" u="none" strike="noStrike" cap="none">
-                          <a:solidFill>
-                            <a:srgbClr val="00D4A0"/>
-                          </a:solidFill>
-                          <a:latin typeface="Calibri"/>
-                          <a:ea typeface="Calibri"/>
-                          <a:cs typeface="Calibri"/>
-                          <a:sym typeface="Calibri"/>
-                        </a:rPr>
-                        <a:t>3.20%</a:t>
-                      </a:r>
-                      <a:endParaRPr/>
-                    </a:p>
-                  </a:txBody>
-                  <a:tcPr marL="63500" marR="63500" marT="25400" marB="25400" anchor="ctr">
-                    <a:lnL w="9525" cap="flat" cmpd="sng">
-                      <a:solidFill>
-                        <a:srgbClr val="000000">
-                          <a:alpha val="0"/>
-                        </a:srgbClr>
-                      </a:solidFill>
-                      <a:prstDash val="solid"/>
-                      <a:round/>
-                      <a:headEnd type="none" w="sm" len="sm"/>
-                      <a:tailEnd type="none" w="sm" len="sm"/>
-                    </a:lnL>
-                    <a:lnR w="9525" cap="flat" cmpd="sng">
-                      <a:solidFill>
-                        <a:srgbClr val="000000">
-                          <a:alpha val="0"/>
-                        </a:srgbClr>
-                      </a:solidFill>
-                      <a:prstDash val="solid"/>
-                      <a:round/>
-                      <a:headEnd type="none" w="sm" len="sm"/>
-                      <a:tailEnd type="none" w="sm" len="sm"/>
-                    </a:lnR>
-                    <a:lnT w="9525" cap="flat" cmpd="sng">
-                      <a:solidFill>
-                        <a:srgbClr val="000000">
-                          <a:alpha val="0"/>
-                        </a:srgbClr>
-                      </a:solidFill>
-                      <a:prstDash val="solid"/>
-                      <a:round/>
-                      <a:headEnd type="none" w="sm" len="sm"/>
-                      <a:tailEnd type="none" w="sm" len="sm"/>
-                    </a:lnT>
-                    <a:lnB w="9525" cap="flat" cmpd="sng">
-                      <a:solidFill>
-                        <a:srgbClr val="000000">
-                          <a:alpha val="0"/>
-                        </a:srgbClr>
-                      </a:solidFill>
-                      <a:prstDash val="solid"/>
-                      <a:round/>
-                      <a:headEnd type="none" w="sm" len="sm"/>
-                      <a:tailEnd type="none" w="sm" len="sm"/>
-                    </a:lnB>
-                    <a:solidFill>
-                      <a:srgbClr val="0F1420"/>
-                    </a:solidFill>
-                  </a:tcPr>
-                </a:tc>
-                <a:tc>
-                  <a:txBody>
-                    <a:bodyPr/>
-                    <a:lstStyle/>
-                    <a:p>
-                      <a:pPr marL="0" marR="0" lvl="0" indent="0" algn="l" rtl="0">
-                        <a:spcBef>
-                          <a:spcPts val="0"/>
-                        </a:spcBef>
-                        <a:spcAft>
-                          <a:spcPts val="0"/>
-                        </a:spcAft>
-                        <a:buNone/>
-                      </a:pPr>
-                      <a:r>
-                        <a:rPr lang="en-US" sz="1125" b="0" i="0" u="none" strike="noStrike" cap="none">
-                          <a:solidFill>
-                            <a:srgbClr val="C8D4F0"/>
-                          </a:solidFill>
-                          <a:latin typeface="Calibri"/>
-                          <a:ea typeface="Calibri"/>
-                          <a:cs typeface="Calibri"/>
-                          <a:sym typeface="Calibri"/>
-                        </a:rPr>
-                        <a:t>35%</a:t>
-                      </a:r>
-                      <a:endParaRPr/>
-                    </a:p>
-                  </a:txBody>
-                  <a:tcPr marL="63500" marR="63500" marT="25400" marB="25400" anchor="ctr">
-                    <a:lnL w="9525" cap="flat" cmpd="sng">
-                      <a:solidFill>
-                        <a:srgbClr val="000000">
-                          <a:alpha val="0"/>
-                        </a:srgbClr>
-                      </a:solidFill>
-                      <a:prstDash val="solid"/>
-                      <a:round/>
-                      <a:headEnd type="none" w="sm" len="sm"/>
-                      <a:tailEnd type="none" w="sm" len="sm"/>
-                    </a:lnL>
-                    <a:lnR w="9525" cap="flat" cmpd="sng">
-                      <a:solidFill>
-                        <a:srgbClr val="000000">
-                          <a:alpha val="0"/>
-                        </a:srgbClr>
-                      </a:solidFill>
-                      <a:prstDash val="solid"/>
-                      <a:round/>
-                      <a:headEnd type="none" w="sm" len="sm"/>
-                      <a:tailEnd type="none" w="sm" len="sm"/>
-                    </a:lnR>
-                    <a:lnT w="9525" cap="flat" cmpd="sng">
-                      <a:solidFill>
-                        <a:srgbClr val="000000">
-                          <a:alpha val="0"/>
-                        </a:srgbClr>
-                      </a:solidFill>
-                      <a:prstDash val="solid"/>
-                      <a:round/>
-                      <a:headEnd type="none" w="sm" len="sm"/>
-                      <a:tailEnd type="none" w="sm" len="sm"/>
-                    </a:lnT>
-                    <a:lnB w="9525" cap="flat" cmpd="sng">
-                      <a:solidFill>
-                        <a:srgbClr val="000000">
-                          <a:alpha val="0"/>
-                        </a:srgbClr>
-                      </a:solidFill>
-                      <a:prstDash val="solid"/>
-                      <a:round/>
-                      <a:headEnd type="none" w="sm" len="sm"/>
-                      <a:tailEnd type="none" w="sm" len="sm"/>
-                    </a:lnB>
-                    <a:solidFill>
-                      <a:srgbClr val="0F1420"/>
-                    </a:solidFill>
-                  </a:tcPr>
-                </a:tc>
-                <a:tc>
-                  <a:txBody>
-                    <a:bodyPr/>
-                    <a:lstStyle/>
-                    <a:p>
-                      <a:pPr marL="0" marR="0" lvl="0" indent="0" algn="l" rtl="0">
+                      <a:pPr marL="0" marR="0" lvl="0" indent="0" algn="ctr" rtl="0">
                         <a:spcBef>
                           <a:spcPts val="0"/>
                         </a:spcBef>
@@ -28126,7 +28132,7 @@
                     <a:bodyPr/>
                     <a:lstStyle/>
                     <a:p>
-                      <a:pPr marL="0" marR="0" lvl="0" indent="0" algn="l" rtl="0">
+                      <a:pPr marL="0" marR="0" lvl="0" indent="0" algn="ctr" rtl="0">
                         <a:spcBef>
                           <a:spcPts val="0"/>
                         </a:spcBef>
@@ -28205,7 +28211,165 @@
                     <a:bodyPr/>
                     <a:lstStyle/>
                     <a:p>
-                      <a:pPr marL="0" marR="0" lvl="0" indent="0" algn="l" rtl="0">
+                      <a:pPr marL="0" marR="0" lvl="0" indent="0" algn="ctr" rtl="0">
+                        <a:spcBef>
+                          <a:spcPts val="0"/>
+                        </a:spcBef>
+                        <a:spcAft>
+                          <a:spcPts val="0"/>
+                        </a:spcAft>
+                        <a:buNone/>
+                      </a:pPr>
+                      <a:r>
+                        <a:rPr lang="en-US" sz="1125" b="0" i="0" u="none" strike="noStrike" cap="none" dirty="0">
+                          <a:solidFill>
+                            <a:srgbClr val="C8D4F0"/>
+                          </a:solidFill>
+                          <a:latin typeface="Calibri"/>
+                          <a:ea typeface="Calibri"/>
+                          <a:cs typeface="Calibri"/>
+                          <a:sym typeface="Calibri"/>
+                        </a:rPr>
+                        <a:t>45%</a:t>
+                      </a:r>
+                      <a:endParaRPr dirty="0"/>
+                    </a:p>
+                  </a:txBody>
+                  <a:tcPr marL="63500" marR="63500" marT="25400" marB="25400" anchor="ctr">
+                    <a:lnL w="9525" cap="flat" cmpd="sng">
+                      <a:solidFill>
+                        <a:srgbClr val="000000">
+                          <a:alpha val="0"/>
+                        </a:srgbClr>
+                      </a:solidFill>
+                      <a:prstDash val="solid"/>
+                      <a:round/>
+                      <a:headEnd type="none" w="sm" len="sm"/>
+                      <a:tailEnd type="none" w="sm" len="sm"/>
+                    </a:lnL>
+                    <a:lnR w="9525" cap="flat" cmpd="sng">
+                      <a:solidFill>
+                        <a:srgbClr val="000000">
+                          <a:alpha val="0"/>
+                        </a:srgbClr>
+                      </a:solidFill>
+                      <a:prstDash val="solid"/>
+                      <a:round/>
+                      <a:headEnd type="none" w="sm" len="sm"/>
+                      <a:tailEnd type="none" w="sm" len="sm"/>
+                    </a:lnR>
+                    <a:lnT w="9525" cap="flat" cmpd="sng">
+                      <a:solidFill>
+                        <a:srgbClr val="000000">
+                          <a:alpha val="0"/>
+                        </a:srgbClr>
+                      </a:solidFill>
+                      <a:prstDash val="solid"/>
+                      <a:round/>
+                      <a:headEnd type="none" w="sm" len="sm"/>
+                      <a:tailEnd type="none" w="sm" len="sm"/>
+                    </a:lnT>
+                    <a:lnB w="9525" cap="flat" cmpd="sng">
+                      <a:solidFill>
+                        <a:srgbClr val="000000">
+                          <a:alpha val="0"/>
+                        </a:srgbClr>
+                      </a:solidFill>
+                      <a:prstDash val="solid"/>
+                      <a:round/>
+                      <a:headEnd type="none" w="sm" len="sm"/>
+                      <a:tailEnd type="none" w="sm" len="sm"/>
+                    </a:lnB>
+                    <a:solidFill>
+                      <a:srgbClr val="0F1420"/>
+                    </a:solidFill>
+                  </a:tcPr>
+                </a:tc>
+                <a:tc>
+                  <a:txBody>
+                    <a:bodyPr/>
+                    <a:lstStyle/>
+                    <a:p>
+                      <a:pPr marL="0" marR="0" lvl="0" indent="0" algn="ctr" rtl="0">
+                        <a:spcBef>
+                          <a:spcPts val="0"/>
+                        </a:spcBef>
+                        <a:spcAft>
+                          <a:spcPts val="0"/>
+                        </a:spcAft>
+                        <a:buNone/>
+                      </a:pPr>
+                      <a:r>
+                        <a:rPr lang="en-US" sz="1275" b="1" i="0" u="none" strike="noStrike" cap="none" dirty="0">
+                          <a:solidFill>
+                            <a:srgbClr val="F0A500"/>
+                          </a:solidFill>
+                          <a:latin typeface="Calibri"/>
+                          <a:ea typeface="Calibri"/>
+                          <a:cs typeface="Calibri"/>
+                          <a:sym typeface="Calibri"/>
+                        </a:rPr>
+                        <a:t>7.70%</a:t>
+                      </a:r>
+                      <a:endParaRPr dirty="0"/>
+                    </a:p>
+                  </a:txBody>
+                  <a:tcPr marL="63500" marR="63500" marT="25400" marB="25400" anchor="ctr">
+                    <a:lnL w="9525" cap="flat" cmpd="sng">
+                      <a:solidFill>
+                        <a:srgbClr val="000000">
+                          <a:alpha val="0"/>
+                        </a:srgbClr>
+                      </a:solidFill>
+                      <a:prstDash val="solid"/>
+                      <a:round/>
+                      <a:headEnd type="none" w="sm" len="sm"/>
+                      <a:tailEnd type="none" w="sm" len="sm"/>
+                    </a:lnL>
+                    <a:lnR w="9525" cap="flat" cmpd="sng">
+                      <a:solidFill>
+                        <a:srgbClr val="000000">
+                          <a:alpha val="0"/>
+                        </a:srgbClr>
+                      </a:solidFill>
+                      <a:prstDash val="solid"/>
+                      <a:round/>
+                      <a:headEnd type="none" w="sm" len="sm"/>
+                      <a:tailEnd type="none" w="sm" len="sm"/>
+                    </a:lnR>
+                    <a:lnT w="9525" cap="flat" cmpd="sng">
+                      <a:solidFill>
+                        <a:srgbClr val="000000">
+                          <a:alpha val="0"/>
+                        </a:srgbClr>
+                      </a:solidFill>
+                      <a:prstDash val="solid"/>
+                      <a:round/>
+                      <a:headEnd type="none" w="sm" len="sm"/>
+                      <a:tailEnd type="none" w="sm" len="sm"/>
+                    </a:lnT>
+                    <a:lnB w="9525" cap="flat" cmpd="sng">
+                      <a:solidFill>
+                        <a:srgbClr val="000000">
+                          <a:alpha val="0"/>
+                        </a:srgbClr>
+                      </a:solidFill>
+                      <a:prstDash val="solid"/>
+                      <a:round/>
+                      <a:headEnd type="none" w="sm" len="sm"/>
+                      <a:tailEnd type="none" w="sm" len="sm"/>
+                    </a:lnB>
+                    <a:solidFill>
+                      <a:srgbClr val="0F1420"/>
+                    </a:solidFill>
+                  </a:tcPr>
+                </a:tc>
+                <a:tc>
+                  <a:txBody>
+                    <a:bodyPr/>
+                    <a:lstStyle/>
+                    <a:p>
+                      <a:pPr marL="0" marR="0" lvl="0" indent="0" algn="ctr" rtl="0">
                         <a:spcBef>
                           <a:spcPts val="0"/>
                         </a:spcBef>
@@ -28284,165 +28448,7 @@
                     <a:bodyPr/>
                     <a:lstStyle/>
                     <a:p>
-                      <a:pPr marL="0" marR="0" lvl="0" indent="0" algn="l" rtl="0">
-                        <a:spcBef>
-                          <a:spcPts val="0"/>
-                        </a:spcBef>
-                        <a:spcAft>
-                          <a:spcPts val="0"/>
-                        </a:spcAft>
-                        <a:buNone/>
-                      </a:pPr>
-                      <a:r>
-                        <a:rPr lang="en-US" sz="1275" b="1" i="0" u="none" strike="noStrike" cap="none">
-                          <a:solidFill>
-                            <a:srgbClr val="F0A500"/>
-                          </a:solidFill>
-                          <a:latin typeface="Calibri"/>
-                          <a:ea typeface="Calibri"/>
-                          <a:cs typeface="Calibri"/>
-                          <a:sym typeface="Calibri"/>
-                        </a:rPr>
-                        <a:t>7.70%</a:t>
-                      </a:r>
-                      <a:endParaRPr/>
-                    </a:p>
-                  </a:txBody>
-                  <a:tcPr marL="63500" marR="63500" marT="25400" marB="25400" anchor="ctr">
-                    <a:lnL w="9525" cap="flat" cmpd="sng">
-                      <a:solidFill>
-                        <a:srgbClr val="000000">
-                          <a:alpha val="0"/>
-                        </a:srgbClr>
-                      </a:solidFill>
-                      <a:prstDash val="solid"/>
-                      <a:round/>
-                      <a:headEnd type="none" w="sm" len="sm"/>
-                      <a:tailEnd type="none" w="sm" len="sm"/>
-                    </a:lnL>
-                    <a:lnR w="9525" cap="flat" cmpd="sng">
-                      <a:solidFill>
-                        <a:srgbClr val="000000">
-                          <a:alpha val="0"/>
-                        </a:srgbClr>
-                      </a:solidFill>
-                      <a:prstDash val="solid"/>
-                      <a:round/>
-                      <a:headEnd type="none" w="sm" len="sm"/>
-                      <a:tailEnd type="none" w="sm" len="sm"/>
-                    </a:lnR>
-                    <a:lnT w="9525" cap="flat" cmpd="sng">
-                      <a:solidFill>
-                        <a:srgbClr val="000000">
-                          <a:alpha val="0"/>
-                        </a:srgbClr>
-                      </a:solidFill>
-                      <a:prstDash val="solid"/>
-                      <a:round/>
-                      <a:headEnd type="none" w="sm" len="sm"/>
-                      <a:tailEnd type="none" w="sm" len="sm"/>
-                    </a:lnT>
-                    <a:lnB w="9525" cap="flat" cmpd="sng">
-                      <a:solidFill>
-                        <a:srgbClr val="000000">
-                          <a:alpha val="0"/>
-                        </a:srgbClr>
-                      </a:solidFill>
-                      <a:prstDash val="solid"/>
-                      <a:round/>
-                      <a:headEnd type="none" w="sm" len="sm"/>
-                      <a:tailEnd type="none" w="sm" len="sm"/>
-                    </a:lnB>
-                    <a:solidFill>
-                      <a:srgbClr val="0F1420"/>
-                    </a:solidFill>
-                  </a:tcPr>
-                </a:tc>
-                <a:tc>
-                  <a:txBody>
-                    <a:bodyPr/>
-                    <a:lstStyle/>
-                    <a:p>
-                      <a:pPr marL="0" marR="0" lvl="0" indent="0" algn="l" rtl="0">
-                        <a:spcBef>
-                          <a:spcPts val="0"/>
-                        </a:spcBef>
-                        <a:spcAft>
-                          <a:spcPts val="0"/>
-                        </a:spcAft>
-                        <a:buNone/>
-                      </a:pPr>
-                      <a:r>
-                        <a:rPr lang="en-US" sz="1125" b="0" i="0" u="none" strike="noStrike" cap="none">
-                          <a:solidFill>
-                            <a:srgbClr val="C8D4F0"/>
-                          </a:solidFill>
-                          <a:latin typeface="Calibri"/>
-                          <a:ea typeface="Calibri"/>
-                          <a:cs typeface="Calibri"/>
-                          <a:sym typeface="Calibri"/>
-                        </a:rPr>
-                        <a:t>45%</a:t>
-                      </a:r>
-                      <a:endParaRPr/>
-                    </a:p>
-                  </a:txBody>
-                  <a:tcPr marL="63500" marR="63500" marT="25400" marB="25400" anchor="ctr">
-                    <a:lnL w="9525" cap="flat" cmpd="sng">
-                      <a:solidFill>
-                        <a:srgbClr val="000000">
-                          <a:alpha val="0"/>
-                        </a:srgbClr>
-                      </a:solidFill>
-                      <a:prstDash val="solid"/>
-                      <a:round/>
-                      <a:headEnd type="none" w="sm" len="sm"/>
-                      <a:tailEnd type="none" w="sm" len="sm"/>
-                    </a:lnL>
-                    <a:lnR w="9525" cap="flat" cmpd="sng">
-                      <a:solidFill>
-                        <a:srgbClr val="000000">
-                          <a:alpha val="0"/>
-                        </a:srgbClr>
-                      </a:solidFill>
-                      <a:prstDash val="solid"/>
-                      <a:round/>
-                      <a:headEnd type="none" w="sm" len="sm"/>
-                      <a:tailEnd type="none" w="sm" len="sm"/>
-                    </a:lnR>
-                    <a:lnT w="9525" cap="flat" cmpd="sng">
-                      <a:solidFill>
-                        <a:srgbClr val="000000">
-                          <a:alpha val="0"/>
-                        </a:srgbClr>
-                      </a:solidFill>
-                      <a:prstDash val="solid"/>
-                      <a:round/>
-                      <a:headEnd type="none" w="sm" len="sm"/>
-                      <a:tailEnd type="none" w="sm" len="sm"/>
-                    </a:lnT>
-                    <a:lnB w="9525" cap="flat" cmpd="sng">
-                      <a:solidFill>
-                        <a:srgbClr val="000000">
-                          <a:alpha val="0"/>
-                        </a:srgbClr>
-                      </a:solidFill>
-                      <a:prstDash val="solid"/>
-                      <a:round/>
-                      <a:headEnd type="none" w="sm" len="sm"/>
-                      <a:tailEnd type="none" w="sm" len="sm"/>
-                    </a:lnB>
-                    <a:solidFill>
-                      <a:srgbClr val="0F1420"/>
-                    </a:solidFill>
-                  </a:tcPr>
-                </a:tc>
-                <a:tc>
-                  <a:txBody>
-                    <a:bodyPr/>
-                    <a:lstStyle/>
-                    <a:p>
-                      <a:pPr marL="0" marR="0" lvl="0" indent="0" algn="l" rtl="0">
+                      <a:pPr marL="0" marR="0" lvl="0" indent="0" algn="ctr" rtl="0">
                         <a:spcBef>
                           <a:spcPts val="0"/>
                         </a:spcBef>
@@ -28528,7 +28534,7 @@
                     <a:bodyPr/>
                     <a:lstStyle/>
                     <a:p>
-                      <a:pPr marL="0" marR="0" lvl="0" indent="0" algn="l" rtl="0">
+                      <a:pPr marL="0" marR="0" lvl="0" indent="0" algn="ctr" rtl="0">
                         <a:spcBef>
                           <a:spcPts val="0"/>
                         </a:spcBef>
@@ -28607,7 +28613,7 @@
                     <a:bodyPr/>
                     <a:lstStyle/>
                     <a:p>
-                      <a:pPr marL="0" marR="0" lvl="0" indent="0" algn="l" rtl="0">
+                      <a:pPr marL="0" marR="0" lvl="0" indent="0" algn="ctr" rtl="0">
                         <a:spcBef>
                           <a:spcPts val="0"/>
                         </a:spcBef>
@@ -28686,7 +28692,7 @@
                     <a:bodyPr/>
                     <a:lstStyle/>
                     <a:p>
-                      <a:pPr marL="0" marR="0" lvl="0" indent="0" algn="l" rtl="0">
+                      <a:pPr marL="0" marR="0" lvl="0" indent="0" algn="ctr" rtl="0">
                         <a:spcBef>
                           <a:spcPts val="0"/>
                         </a:spcBef>
@@ -28696,7 +28702,7 @@
                         <a:buNone/>
                       </a:pPr>
                       <a:r>
-                        <a:rPr lang="en-US" sz="1275" b="1" i="0" u="none" strike="noStrike" cap="none">
+                        <a:rPr lang="en-US" sz="1275" b="1" i="0" u="none" strike="noStrike" cap="none" dirty="0">
                           <a:solidFill>
                             <a:srgbClr val="E84040"/>
                           </a:solidFill>
@@ -28707,7 +28713,7 @@
                         </a:rPr>
                         <a:t>20.06%</a:t>
                       </a:r>
-                      <a:endParaRPr/>
+                      <a:endParaRPr dirty="0"/>
                     </a:p>
                   </a:txBody>
                   <a:tcPr marL="63500" marR="63500" marT="25400" marB="25400" anchor="ctr">
@@ -28765,7 +28771,7 @@
                     <a:bodyPr/>
                     <a:lstStyle/>
                     <a:p>
-                      <a:pPr marL="0" marR="0" lvl="0" indent="0" algn="l" rtl="0">
+                      <a:pPr marL="0" marR="0" lvl="0" indent="0" algn="ctr" rtl="0">
                         <a:spcBef>
                           <a:spcPts val="0"/>
                         </a:spcBef>
@@ -28775,7 +28781,7 @@
                         <a:buNone/>
                       </a:pPr>
                       <a:r>
-                        <a:rPr lang="en-US" sz="1125" b="0" i="0" u="none" strike="noStrike" cap="none">
+                        <a:rPr lang="en-US" sz="1125" b="0" i="0" u="none" strike="noStrike" cap="none" dirty="0">
                           <a:solidFill>
                             <a:srgbClr val="C8D4F0"/>
                           </a:solidFill>
@@ -28786,7 +28792,7 @@
                         </a:rPr>
                         <a:t>60%</a:t>
                       </a:r>
-                      <a:endParaRPr/>
+                      <a:endParaRPr dirty="0"/>
                     </a:p>
                   </a:txBody>
                   <a:tcPr marL="63500" marR="63500" marT="25400" marB="25400" anchor="ctr">
@@ -28844,7 +28850,7 @@
                     <a:bodyPr/>
                     <a:lstStyle/>
                     <a:p>
-                      <a:pPr marL="0" marR="0" lvl="0" indent="0" algn="l" rtl="0">
+                      <a:pPr marL="0" marR="0" lvl="0" indent="0" algn="ctr" rtl="0">
                         <a:spcBef>
                           <a:spcPts val="0"/>
                         </a:spcBef>
@@ -28854,7 +28860,7 @@
                         <a:buNone/>
                       </a:pPr>
                       <a:r>
-                        <a:rPr lang="en-US" sz="1125" b="0" i="0" u="none" strike="noStrike" cap="none">
+                        <a:rPr lang="en-US" sz="1125" b="0" i="0" u="none" strike="noStrike" cap="none" dirty="0">
                           <a:solidFill>
                             <a:srgbClr val="C8D4F0"/>
                           </a:solidFill>
@@ -28865,7 +28871,7 @@
                         </a:rPr>
                         <a:t>~48%</a:t>
                       </a:r>
-                      <a:endParaRPr/>
+                      <a:endParaRPr dirty="0"/>
                     </a:p>
                   </a:txBody>
                   <a:tcPr marL="63500" marR="63500" marT="25400" marB="25400" anchor="ctr">
@@ -28930,7 +28936,7 @@
                     <a:bodyPr/>
                     <a:lstStyle/>
                     <a:p>
-                      <a:pPr marL="0" marR="0" lvl="0" indent="0" algn="l" rtl="0">
+                      <a:pPr marL="0" marR="0" lvl="0" indent="0" algn="ctr" rtl="0">
                         <a:spcBef>
                           <a:spcPts val="0"/>
                         </a:spcBef>
@@ -29009,7 +29015,7 @@
                     <a:bodyPr/>
                     <a:lstStyle/>
                     <a:p>
-                      <a:pPr marL="0" marR="0" lvl="0" indent="0" algn="l" rtl="0">
+                      <a:pPr marL="0" marR="0" lvl="0" indent="0" algn="ctr" rtl="0">
                         <a:spcBef>
                           <a:spcPts val="0"/>
                         </a:spcBef>
@@ -29088,7 +29094,7 @@
                     <a:bodyPr/>
                     <a:lstStyle/>
                     <a:p>
-                      <a:pPr marL="0" marR="0" lvl="0" indent="0" algn="l" rtl="0">
+                      <a:pPr marL="0" marR="0" lvl="0" indent="0" algn="ctr" rtl="0">
                         <a:spcBef>
                           <a:spcPts val="0"/>
                         </a:spcBef>
@@ -29167,7 +29173,7 @@
                     <a:bodyPr/>
                     <a:lstStyle/>
                     <a:p>
-                      <a:pPr marL="0" marR="0" lvl="0" indent="0" algn="l" rtl="0">
+                      <a:pPr marL="0" marR="0" lvl="0" indent="0" algn="ctr" rtl="0">
                         <a:spcBef>
                           <a:spcPts val="0"/>
                         </a:spcBef>
@@ -29246,7 +29252,7 @@
                     <a:bodyPr/>
                     <a:lstStyle/>
                     <a:p>
-                      <a:pPr marL="0" marR="0" lvl="0" indent="0" algn="l" rtl="0">
+                      <a:pPr marL="0" marR="0" lvl="0" indent="0" algn="ctr" rtl="0">
                         <a:spcBef>
                           <a:spcPts val="0"/>
                         </a:spcBef>
@@ -29256,7 +29262,7 @@
                         <a:buNone/>
                       </a:pPr>
                       <a:r>
-                        <a:rPr lang="en-US" sz="1125" b="1" i="0" u="none" strike="noStrike" cap="none">
+                        <a:rPr lang="en-US" sz="1125" b="1" i="0" u="none" strike="noStrike" cap="none" dirty="0">
                           <a:solidFill>
                             <a:srgbClr val="C8D4F0"/>
                           </a:solidFill>
@@ -29267,7 +29273,7 @@
                         </a:rPr>
                         <a:t>~37%</a:t>
                       </a:r>
-                      <a:endParaRPr/>
+                      <a:endParaRPr dirty="0"/>
                     </a:p>
                   </a:txBody>
                   <a:tcPr marL="63500" marR="63500" marT="25400" marB="25400" anchor="ctr">

</xml_diff>